<commit_message>
add local beam search to hill climb
</commit_message>
<xml_diff>
--- a/Presentations/AI - Hill Climbing.pptx
+++ b/Presentations/AI - Hill Climbing.pptx
@@ -5,7 +5,7 @@
     <p:sldMasterId id="2147483648" r:id="rId1"/>
   </p:sldMasterIdLst>
   <p:notesMasterIdLst>
-    <p:notesMasterId r:id="rId10"/>
+    <p:notesMasterId r:id="rId11"/>
   </p:notesMasterIdLst>
   <p:sldIdLst>
     <p:sldId id="256" r:id="rId2"/>
@@ -16,6 +16,7 @@
     <p:sldId id="285" r:id="rId7"/>
     <p:sldId id="286" r:id="rId8"/>
     <p:sldId id="287" r:id="rId9"/>
+    <p:sldId id="288" r:id="rId10"/>
   </p:sldIdLst>
   <p:sldSz cx="9144000" cy="6858000" type="screen4x3"/>
   <p:notesSz cx="6858000" cy="9144000"/>
@@ -199,7 +200,7 @@
           <a:p>
             <a:fld id="{FAF957FC-5175-49AC-8D2B-2F056FFFC1DD}" type="datetimeFigureOut">
               <a:rPr lang="en-US" smtClean="0"/>
-              <a:t>7/25/2017</a:t>
+              <a:t>7/26/2017</a:t>
             </a:fld>
             <a:endParaRPr lang="en-US"/>
           </a:p>
@@ -649,7 +650,7 @@
             <a:fld id="{1D8BD707-D9CF-40AE-B4C6-C98DA3205C09}" type="datetimeFigureOut">
               <a:rPr lang="en-US" smtClean="0"/>
               <a:pPr/>
-              <a:t>7/25/2017</a:t>
+              <a:t>7/26/2017</a:t>
             </a:fld>
             <a:endParaRPr lang="en-US"/>
           </a:p>
@@ -816,7 +817,7 @@
             <a:fld id="{1D8BD707-D9CF-40AE-B4C6-C98DA3205C09}" type="datetimeFigureOut">
               <a:rPr lang="en-US" smtClean="0"/>
               <a:pPr/>
-              <a:t>7/25/2017</a:t>
+              <a:t>7/26/2017</a:t>
             </a:fld>
             <a:endParaRPr lang="en-US"/>
           </a:p>
@@ -993,7 +994,7 @@
             <a:fld id="{1D8BD707-D9CF-40AE-B4C6-C98DA3205C09}" type="datetimeFigureOut">
               <a:rPr lang="en-US" smtClean="0"/>
               <a:pPr/>
-              <a:t>7/25/2017</a:t>
+              <a:t>7/26/2017</a:t>
             </a:fld>
             <a:endParaRPr lang="en-US"/>
           </a:p>
@@ -1160,7 +1161,7 @@
             <a:fld id="{1D8BD707-D9CF-40AE-B4C6-C98DA3205C09}" type="datetimeFigureOut">
               <a:rPr lang="en-US" smtClean="0"/>
               <a:pPr/>
-              <a:t>7/25/2017</a:t>
+              <a:t>7/26/2017</a:t>
             </a:fld>
             <a:endParaRPr lang="en-US"/>
           </a:p>
@@ -1403,7 +1404,7 @@
             <a:fld id="{1D8BD707-D9CF-40AE-B4C6-C98DA3205C09}" type="datetimeFigureOut">
               <a:rPr lang="en-US" smtClean="0"/>
               <a:pPr/>
-              <a:t>7/25/2017</a:t>
+              <a:t>7/26/2017</a:t>
             </a:fld>
             <a:endParaRPr lang="en-US"/>
           </a:p>
@@ -1688,7 +1689,7 @@
             <a:fld id="{1D8BD707-D9CF-40AE-B4C6-C98DA3205C09}" type="datetimeFigureOut">
               <a:rPr lang="en-US" smtClean="0"/>
               <a:pPr/>
-              <a:t>7/25/2017</a:t>
+              <a:t>7/26/2017</a:t>
             </a:fld>
             <a:endParaRPr lang="en-US"/>
           </a:p>
@@ -2107,7 +2108,7 @@
             <a:fld id="{1D8BD707-D9CF-40AE-B4C6-C98DA3205C09}" type="datetimeFigureOut">
               <a:rPr lang="en-US" smtClean="0"/>
               <a:pPr/>
-              <a:t>7/25/2017</a:t>
+              <a:t>7/26/2017</a:t>
             </a:fld>
             <a:endParaRPr lang="en-US"/>
           </a:p>
@@ -2222,7 +2223,7 @@
             <a:fld id="{1D8BD707-D9CF-40AE-B4C6-C98DA3205C09}" type="datetimeFigureOut">
               <a:rPr lang="en-US" smtClean="0"/>
               <a:pPr/>
-              <a:t>7/25/2017</a:t>
+              <a:t>7/26/2017</a:t>
             </a:fld>
             <a:endParaRPr lang="en-US"/>
           </a:p>
@@ -2314,7 +2315,7 @@
             <a:fld id="{1D8BD707-D9CF-40AE-B4C6-C98DA3205C09}" type="datetimeFigureOut">
               <a:rPr lang="en-US" smtClean="0"/>
               <a:pPr/>
-              <a:t>7/25/2017</a:t>
+              <a:t>7/26/2017</a:t>
             </a:fld>
             <a:endParaRPr lang="en-US"/>
           </a:p>
@@ -2588,7 +2589,7 @@
             <a:fld id="{1D8BD707-D9CF-40AE-B4C6-C98DA3205C09}" type="datetimeFigureOut">
               <a:rPr lang="en-US" smtClean="0"/>
               <a:pPr/>
-              <a:t>7/25/2017</a:t>
+              <a:t>7/26/2017</a:t>
             </a:fld>
             <a:endParaRPr lang="en-US"/>
           </a:p>
@@ -2838,7 +2839,7 @@
             <a:fld id="{1D8BD707-D9CF-40AE-B4C6-C98DA3205C09}" type="datetimeFigureOut">
               <a:rPr lang="en-US" smtClean="0"/>
               <a:pPr/>
-              <a:t>7/25/2017</a:t>
+              <a:t>7/26/2017</a:t>
             </a:fld>
             <a:endParaRPr lang="en-US"/>
           </a:p>
@@ -3048,7 +3049,7 @@
             <a:fld id="{1D8BD707-D9CF-40AE-B4C6-C98DA3205C09}" type="datetimeFigureOut">
               <a:rPr lang="en-US" smtClean="0"/>
               <a:pPr/>
-              <a:t>7/25/2017</a:t>
+              <a:t>7/26/2017</a:t>
             </a:fld>
             <a:endParaRPr lang="en-US"/>
           </a:p>
@@ -3487,30 +3488,30 @@
                   </a:schemeClr>
                 </a:solidFill>
               </a:rPr>
-              <a:t>Portland </a:t>
-            </a:r>
-            <a:r>
-              <a:rPr lang="en-US" sz="2400" dirty="0" smtClean="0">
+              <a:t>Portland Data Science Group</a:t>
+            </a:r>
+          </a:p>
+          <a:p>
+            <a:r>
+              <a:rPr lang="en-US" sz="2400" dirty="0">
                 <a:solidFill>
                   <a:schemeClr val="accent1">
                     <a:lumMod val="75000"/>
                   </a:schemeClr>
                 </a:solidFill>
               </a:rPr>
-              <a:t>Data Science </a:t>
-            </a:r>
-            <a:r>
-              <a:rPr lang="en-US" sz="2400" dirty="0" smtClean="0">
+              <a:t>Created by Andrew </a:t>
+            </a:r>
+            <a:r>
+              <a:rPr lang="en-US" sz="2400" dirty="0" err="1" smtClean="0">
                 <a:solidFill>
                   <a:schemeClr val="accent1">
                     <a:lumMod val="75000"/>
                   </a:schemeClr>
                 </a:solidFill>
               </a:rPr>
-              <a:t>Group</a:t>
-            </a:r>
-          </a:p>
-          <a:p>
+              <a:t>Ferlitsch</a:t>
+            </a:r>
             <a:r>
               <a:rPr lang="en-US" sz="2400" dirty="0">
                 <a:solidFill>
@@ -3519,18 +3520,17 @@
                   </a:schemeClr>
                 </a:solidFill>
               </a:rPr>
-              <a:t>Created by Andrew </a:t>
-            </a:r>
-            <a:r>
-              <a:rPr lang="en-US" sz="2400" dirty="0" err="1" smtClean="0">
+              <a:t/>
+            </a:r>
+            <a:br>
+              <a:rPr lang="en-US" sz="2400" dirty="0">
                 <a:solidFill>
                   <a:schemeClr val="accent1">
                     <a:lumMod val="75000"/>
                   </a:schemeClr>
                 </a:solidFill>
               </a:rPr>
-              <a:t>Ferlitsch</a:t>
-            </a:r>
+            </a:br>
             <a:r>
               <a:rPr lang="en-US" sz="2400" dirty="0">
                 <a:solidFill>
@@ -3539,35 +3539,16 @@
                   </a:schemeClr>
                 </a:solidFill>
               </a:rPr>
-              <a:t/>
-            </a:r>
-            <a:br>
-              <a:rPr lang="en-US" sz="2400" dirty="0">
+              <a:t>Community Outreach </a:t>
+            </a:r>
+            <a:r>
+              <a:rPr lang="en-US" sz="2400" dirty="0" smtClean="0">
                 <a:solidFill>
                   <a:schemeClr val="accent1">
                     <a:lumMod val="75000"/>
                   </a:schemeClr>
                 </a:solidFill>
               </a:rPr>
-            </a:br>
-            <a:r>
-              <a:rPr lang="en-US" sz="2400" dirty="0">
-                <a:solidFill>
-                  <a:schemeClr val="accent1">
-                    <a:lumMod val="75000"/>
-                  </a:schemeClr>
-                </a:solidFill>
-              </a:rPr>
-              <a:t>Community Outreach </a:t>
-            </a:r>
-            <a:r>
-              <a:rPr lang="en-US" sz="2400" dirty="0" smtClean="0">
-                <a:solidFill>
-                  <a:schemeClr val="accent1">
-                    <a:lumMod val="75000"/>
-                  </a:schemeClr>
-                </a:solidFill>
-              </a:rPr>
               <a:t>Officer</a:t>
             </a:r>
             <a:r>
@@ -3579,11 +3560,7 @@
             </a:br>
             <a:r>
               <a:rPr lang="en-US" sz="1800" dirty="0" smtClean="0"/>
-              <a:t>July, </a:t>
-            </a:r>
-            <a:r>
-              <a:rPr lang="en-US" sz="1800" dirty="0" smtClean="0"/>
-              <a:t>2017</a:t>
+              <a:t>July, 2017</a:t>
             </a:r>
             <a:endParaRPr lang="en-US" sz="1800" dirty="0"/>
           </a:p>
@@ -6183,15 +6160,7 @@
           <a:p>
             <a:r>
               <a:rPr lang="en-US" sz="1400" dirty="0" smtClean="0"/>
-              <a:t>v(B) </a:t>
-            </a:r>
-            <a:r>
-              <a:rPr lang="en-US" sz="1400" dirty="0" smtClean="0"/>
-              <a:t>= </a:t>
-            </a:r>
-            <a:r>
-              <a:rPr lang="en-US" sz="1400" dirty="0" smtClean="0"/>
-              <a:t>1</a:t>
+              <a:t>v(B) = 1</a:t>
             </a:r>
             <a:endParaRPr lang="en-US" sz="1400" dirty="0"/>
           </a:p>
@@ -6221,15 +6190,7 @@
           <a:p>
             <a:r>
               <a:rPr lang="en-US" sz="1400" dirty="0" smtClean="0"/>
-              <a:t>v(C) </a:t>
-            </a:r>
-            <a:r>
-              <a:rPr lang="en-US" sz="1400" dirty="0" smtClean="0"/>
-              <a:t>= </a:t>
-            </a:r>
-            <a:r>
-              <a:rPr lang="en-US" sz="1400" dirty="0" smtClean="0"/>
-              <a:t>2</a:t>
+              <a:t>v(C) = 2</a:t>
             </a:r>
             <a:endParaRPr lang="en-US" sz="1400" dirty="0"/>
           </a:p>
@@ -6259,15 +6220,7 @@
           <a:p>
             <a:r>
               <a:rPr lang="en-US" sz="1400" dirty="0" smtClean="0"/>
-              <a:t>v(E) </a:t>
-            </a:r>
-            <a:r>
-              <a:rPr lang="en-US" sz="1400" dirty="0" smtClean="0"/>
-              <a:t>= </a:t>
-            </a:r>
-            <a:r>
-              <a:rPr lang="en-US" sz="1400" dirty="0" smtClean="0"/>
-              <a:t>1</a:t>
+              <a:t>v(E) = 1</a:t>
             </a:r>
             <a:endParaRPr lang="en-US" sz="1400" dirty="0"/>
           </a:p>
@@ -6333,15 +6286,7 @@
           <a:p>
             <a:r>
               <a:rPr lang="en-US" sz="1400" dirty="0" smtClean="0"/>
-              <a:t>v(D) </a:t>
-            </a:r>
-            <a:r>
-              <a:rPr lang="en-US" sz="1400" dirty="0" smtClean="0"/>
-              <a:t>= </a:t>
-            </a:r>
-            <a:r>
-              <a:rPr lang="en-US" sz="1400" dirty="0" smtClean="0"/>
-              <a:t>2</a:t>
+              <a:t>v(D) = 2</a:t>
             </a:r>
             <a:endParaRPr lang="en-US" sz="1400" dirty="0"/>
           </a:p>
@@ -6507,15 +6452,7 @@
           <a:p>
             <a:r>
               <a:rPr lang="en-US" sz="1400" dirty="0" smtClean="0"/>
-              <a:t>v(F) </a:t>
-            </a:r>
-            <a:r>
-              <a:rPr lang="en-US" sz="1400" dirty="0" smtClean="0"/>
-              <a:t>= </a:t>
-            </a:r>
-            <a:r>
-              <a:rPr lang="en-US" sz="1400" dirty="0" smtClean="0"/>
-              <a:t>2</a:t>
+              <a:t>v(F) = 2</a:t>
             </a:r>
             <a:endParaRPr lang="en-US" sz="1400" dirty="0"/>
           </a:p>
@@ -6551,17 +6488,7 @@
                   </a:schemeClr>
                 </a:solidFill>
               </a:rPr>
-              <a:t>Global </a:t>
-            </a:r>
-            <a:r>
-              <a:rPr lang="en-US" sz="1400" b="1" dirty="0" smtClean="0">
-                <a:solidFill>
-                  <a:schemeClr val="accent6">
-                    <a:lumMod val="50000"/>
-                  </a:schemeClr>
-                </a:solidFill>
-              </a:rPr>
-              <a:t>maximum</a:t>
+              <a:t>Global maximum</a:t>
             </a:r>
           </a:p>
           <a:p>
@@ -7029,15 +6956,7 @@
           <a:p>
             <a:r>
               <a:rPr lang="en-US" sz="1400" dirty="0" smtClean="0"/>
-              <a:t>v(B) </a:t>
-            </a:r>
-            <a:r>
-              <a:rPr lang="en-US" sz="1400" dirty="0" smtClean="0"/>
-              <a:t>= </a:t>
-            </a:r>
-            <a:r>
-              <a:rPr lang="en-US" sz="1400" dirty="0" smtClean="0"/>
-              <a:t>2</a:t>
+              <a:t>v(B) = 2</a:t>
             </a:r>
             <a:endParaRPr lang="en-US" sz="1400" dirty="0"/>
           </a:p>
@@ -7067,15 +6986,7 @@
           <a:p>
             <a:r>
               <a:rPr lang="en-US" sz="1400" dirty="0" smtClean="0"/>
-              <a:t>v(C) </a:t>
-            </a:r>
-            <a:r>
-              <a:rPr lang="en-US" sz="1400" dirty="0" smtClean="0"/>
-              <a:t>= </a:t>
-            </a:r>
-            <a:r>
-              <a:rPr lang="en-US" sz="1400" dirty="0" smtClean="0"/>
-              <a:t>1</a:t>
+              <a:t>v(C) = 1</a:t>
             </a:r>
             <a:endParaRPr lang="en-US" sz="1400" dirty="0"/>
           </a:p>
@@ -7105,15 +7016,7 @@
           <a:p>
             <a:r>
               <a:rPr lang="en-US" sz="1400" dirty="0" smtClean="0"/>
-              <a:t>v(E) </a:t>
-            </a:r>
-            <a:r>
-              <a:rPr lang="en-US" sz="1400" dirty="0" smtClean="0"/>
-              <a:t>= </a:t>
-            </a:r>
-            <a:r>
-              <a:rPr lang="en-US" sz="1400" dirty="0" smtClean="0"/>
-              <a:t>2</a:t>
+              <a:t>v(E) = 2</a:t>
             </a:r>
             <a:endParaRPr lang="en-US" sz="1400" dirty="0"/>
           </a:p>
@@ -7181,15 +7084,7 @@
           <a:p>
             <a:r>
               <a:rPr lang="en-US" sz="1400" dirty="0" smtClean="0"/>
-              <a:t>v(D) </a:t>
-            </a:r>
-            <a:r>
-              <a:rPr lang="en-US" sz="1400" dirty="0" smtClean="0"/>
-              <a:t>= </a:t>
-            </a:r>
-            <a:r>
-              <a:rPr lang="en-US" sz="1400" dirty="0" smtClean="0"/>
-              <a:t>2</a:t>
+              <a:t>v(D) = 2</a:t>
             </a:r>
             <a:endParaRPr lang="en-US" sz="1400" dirty="0"/>
           </a:p>
@@ -7351,15 +7246,7 @@
           <a:p>
             <a:r>
               <a:rPr lang="en-US" sz="1400" dirty="0" smtClean="0"/>
-              <a:t>v(F) </a:t>
-            </a:r>
-            <a:r>
-              <a:rPr lang="en-US" sz="1400" dirty="0" smtClean="0"/>
-              <a:t>= </a:t>
-            </a:r>
-            <a:r>
-              <a:rPr lang="en-US" sz="1400" dirty="0" smtClean="0"/>
-              <a:t>2</a:t>
+              <a:t>v(F) = 2</a:t>
             </a:r>
             <a:endParaRPr lang="en-US" sz="1400" dirty="0"/>
           </a:p>
@@ -7395,17 +7282,7 @@
                   </a:schemeClr>
                 </a:solidFill>
               </a:rPr>
-              <a:t>Global </a:t>
-            </a:r>
-            <a:r>
-              <a:rPr lang="en-US" sz="1400" b="1" dirty="0" smtClean="0">
-                <a:solidFill>
-                  <a:schemeClr val="accent6">
-                    <a:lumMod val="50000"/>
-                  </a:schemeClr>
-                </a:solidFill>
-              </a:rPr>
-              <a:t>maximum</a:t>
+              <a:t>Global maximum</a:t>
             </a:r>
           </a:p>
           <a:p>
@@ -8929,15 +8806,7 @@
           <a:p>
             <a:r>
               <a:rPr lang="en-US" sz="1400" dirty="0" smtClean="0"/>
-              <a:t>v(B) </a:t>
-            </a:r>
-            <a:r>
-              <a:rPr lang="en-US" sz="1400" dirty="0" smtClean="0"/>
-              <a:t>= </a:t>
-            </a:r>
-            <a:r>
-              <a:rPr lang="en-US" sz="1400" dirty="0" smtClean="0"/>
-              <a:t>0</a:t>
+              <a:t>v(B) = 0</a:t>
             </a:r>
             <a:endParaRPr lang="en-US" sz="1400" dirty="0"/>
           </a:p>
@@ -8967,15 +8836,7 @@
           <a:p>
             <a:r>
               <a:rPr lang="en-US" sz="1400" dirty="0" smtClean="0"/>
-              <a:t>v(C) </a:t>
-            </a:r>
-            <a:r>
-              <a:rPr lang="en-US" sz="1400" dirty="0" smtClean="0"/>
-              <a:t>= </a:t>
-            </a:r>
-            <a:r>
-              <a:rPr lang="en-US" sz="1400" dirty="0" smtClean="0"/>
-              <a:t>0</a:t>
+              <a:t>v(C) = 0</a:t>
             </a:r>
             <a:endParaRPr lang="en-US" sz="1400" dirty="0"/>
           </a:p>
@@ -9005,15 +8866,7 @@
           <a:p>
             <a:r>
               <a:rPr lang="en-US" sz="1400" dirty="0" smtClean="0"/>
-              <a:t>v(E) </a:t>
-            </a:r>
-            <a:r>
-              <a:rPr lang="en-US" sz="1400" dirty="0" smtClean="0"/>
-              <a:t>= </a:t>
-            </a:r>
-            <a:r>
-              <a:rPr lang="en-US" sz="1400" dirty="0" smtClean="0"/>
-              <a:t>1</a:t>
+              <a:t>v(E) = 1</a:t>
             </a:r>
             <a:endParaRPr lang="en-US" sz="1400" dirty="0"/>
           </a:p>
@@ -9079,15 +8932,7 @@
           <a:p>
             <a:r>
               <a:rPr lang="en-US" sz="1400" dirty="0" smtClean="0"/>
-              <a:t>v(D) </a:t>
-            </a:r>
-            <a:r>
-              <a:rPr lang="en-US" sz="1400" dirty="0" smtClean="0"/>
-              <a:t>= </a:t>
-            </a:r>
-            <a:r>
-              <a:rPr lang="en-US" sz="1400" dirty="0" smtClean="0"/>
-              <a:t>2</a:t>
+              <a:t>v(D) = 2</a:t>
             </a:r>
             <a:endParaRPr lang="en-US" sz="1400" dirty="0"/>
           </a:p>
@@ -9252,15 +9097,7 @@
           <a:p>
             <a:r>
               <a:rPr lang="en-US" sz="1400" dirty="0" smtClean="0"/>
-              <a:t>v(F) </a:t>
-            </a:r>
-            <a:r>
-              <a:rPr lang="en-US" sz="1400" dirty="0" smtClean="0"/>
-              <a:t>= </a:t>
-            </a:r>
-            <a:r>
-              <a:rPr lang="en-US" sz="1400" dirty="0" smtClean="0"/>
-              <a:t>2</a:t>
+              <a:t>v(F) = 2</a:t>
             </a:r>
             <a:endParaRPr lang="en-US" sz="1400" dirty="0"/>
           </a:p>
@@ -9296,17 +9133,7 @@
                   </a:schemeClr>
                 </a:solidFill>
               </a:rPr>
-              <a:t>Global </a:t>
-            </a:r>
-            <a:r>
-              <a:rPr lang="en-US" sz="1400" b="1" dirty="0" smtClean="0">
-                <a:solidFill>
-                  <a:schemeClr val="accent6">
-                    <a:lumMod val="50000"/>
-                  </a:schemeClr>
-                </a:solidFill>
-              </a:rPr>
-              <a:t>maximum</a:t>
+              <a:t>Global maximum</a:t>
             </a:r>
           </a:p>
           <a:p>
@@ -9940,15 +9767,7 @@
           <a:p>
             <a:r>
               <a:rPr lang="en-US" sz="1400" dirty="0" smtClean="0"/>
-              <a:t>v(B) </a:t>
-            </a:r>
-            <a:r>
-              <a:rPr lang="en-US" sz="1400" dirty="0" smtClean="0"/>
-              <a:t>= </a:t>
-            </a:r>
-            <a:r>
-              <a:rPr lang="en-US" sz="1400" dirty="0" smtClean="0"/>
-              <a:t>0</a:t>
+              <a:t>v(B) = 0</a:t>
             </a:r>
             <a:endParaRPr lang="en-US" sz="1400" dirty="0"/>
           </a:p>
@@ -9978,15 +9797,7 @@
           <a:p>
             <a:r>
               <a:rPr lang="en-US" sz="1400" dirty="0" smtClean="0"/>
-              <a:t>v(C) </a:t>
-            </a:r>
-            <a:r>
-              <a:rPr lang="en-US" sz="1400" dirty="0" smtClean="0"/>
-              <a:t>= </a:t>
-            </a:r>
-            <a:r>
-              <a:rPr lang="en-US" sz="1400" dirty="0" smtClean="0"/>
-              <a:t>0</a:t>
+              <a:t>v(C) = 0</a:t>
             </a:r>
             <a:endParaRPr lang="en-US" sz="1400" dirty="0"/>
           </a:p>
@@ -10016,15 +9827,7 @@
           <a:p>
             <a:r>
               <a:rPr lang="en-US" sz="1400" dirty="0" smtClean="0"/>
-              <a:t>v(E) </a:t>
-            </a:r>
-            <a:r>
-              <a:rPr lang="en-US" sz="1400" dirty="0" smtClean="0"/>
-              <a:t>= </a:t>
-            </a:r>
-            <a:r>
-              <a:rPr lang="en-US" sz="1400" dirty="0" smtClean="0"/>
-              <a:t>1</a:t>
+              <a:t>v(E) = 1</a:t>
             </a:r>
             <a:endParaRPr lang="en-US" sz="1400" dirty="0"/>
           </a:p>
@@ -10090,15 +9893,7 @@
           <a:p>
             <a:r>
               <a:rPr lang="en-US" sz="1400" dirty="0" smtClean="0"/>
-              <a:t>v(D) </a:t>
-            </a:r>
-            <a:r>
-              <a:rPr lang="en-US" sz="1400" dirty="0" smtClean="0"/>
-              <a:t>= </a:t>
-            </a:r>
-            <a:r>
-              <a:rPr lang="en-US" sz="1400" dirty="0" smtClean="0"/>
-              <a:t>2</a:t>
+              <a:t>v(D) = 2</a:t>
             </a:r>
             <a:endParaRPr lang="en-US" sz="1400" dirty="0"/>
           </a:p>
@@ -10264,15 +10059,7 @@
           <a:p>
             <a:r>
               <a:rPr lang="en-US" sz="1400" dirty="0" smtClean="0"/>
-              <a:t>v(F) </a:t>
-            </a:r>
-            <a:r>
-              <a:rPr lang="en-US" sz="1400" dirty="0" smtClean="0"/>
-              <a:t>= </a:t>
-            </a:r>
-            <a:r>
-              <a:rPr lang="en-US" sz="1400" dirty="0" smtClean="0"/>
-              <a:t>2</a:t>
+              <a:t>v(F) = 2</a:t>
             </a:r>
             <a:endParaRPr lang="en-US" sz="1400" dirty="0"/>
           </a:p>
@@ -10308,17 +10095,7 @@
                   </a:schemeClr>
                 </a:solidFill>
               </a:rPr>
-              <a:t>Global </a:t>
-            </a:r>
-            <a:r>
-              <a:rPr lang="en-US" sz="1400" b="1" dirty="0" smtClean="0">
-                <a:solidFill>
-                  <a:schemeClr val="accent6">
-                    <a:lumMod val="50000"/>
-                  </a:schemeClr>
-                </a:solidFill>
-              </a:rPr>
-              <a:t>maximum</a:t>
+              <a:t>Global maximum</a:t>
             </a:r>
           </a:p>
           <a:p>
@@ -11261,15 +11038,7 @@
                   <a:srgbClr val="FF0000"/>
                 </a:solidFill>
               </a:rPr>
-              <a:t>Add parameter for </a:t>
-            </a:r>
-            <a:r>
-              <a:rPr lang="en-US" sz="1400" dirty="0" smtClean="0">
-                <a:solidFill>
-                  <a:srgbClr val="FF0000"/>
-                </a:solidFill>
-              </a:rPr>
-              <a:t>number of sideways moves</a:t>
+              <a:t>Add parameter for number of sideways moves</a:t>
             </a:r>
             <a:endParaRPr lang="en-US" sz="1400" dirty="0">
               <a:solidFill>
@@ -11643,7 +11412,7 @@
                   </a:schemeClr>
                 </a:solidFill>
               </a:rPr>
-              <a:t>Other Variant</a:t>
+              <a:t>Variant - Stochastic</a:t>
             </a:r>
             <a:endParaRPr lang="en-US" dirty="0">
               <a:solidFill>
@@ -11839,9 +11608,82 @@
               </a:rPr>
               <a:t>   global maximum).</a:t>
             </a:r>
-            <a:endParaRPr lang="en-US" sz="2400" b="1" dirty="0" smtClean="0">
+          </a:p>
+        </p:txBody>
+      </p:sp>
+    </p:spTree>
+    <p:extLst>
+      <p:ext uri="{BB962C8B-B14F-4D97-AF65-F5344CB8AC3E}">
+        <p14:creationId xmlns:p14="http://schemas.microsoft.com/office/powerpoint/2010/main" val="1995494273"/>
+      </p:ext>
+    </p:extLst>
+  </p:cSld>
+  <p:clrMapOvr>
+    <a:masterClrMapping/>
+  </p:clrMapOvr>
+  <p:timing>
+    <p:tnLst>
+      <p:par>
+        <p:cTn id="1" dur="indefinite" restart="never" nodeType="tmRoot"/>
+      </p:par>
+    </p:tnLst>
+  </p:timing>
+</p:sld>
+</file>
+
+<file path=ppt/slides/slide9.xml><?xml version="1.0" encoding="utf-8"?>
+<p:sld xmlns:a="http://schemas.openxmlformats.org/drawingml/2006/main" xmlns:r="http://schemas.openxmlformats.org/officeDocument/2006/relationships" xmlns:p="http://schemas.openxmlformats.org/presentationml/2006/main">
+  <p:cSld>
+    <p:spTree>
+      <p:nvGrpSpPr>
+        <p:cNvPr id="1" name=""/>
+        <p:cNvGrpSpPr/>
+        <p:nvPr/>
+      </p:nvGrpSpPr>
+      <p:grpSpPr>
+        <a:xfrm>
+          <a:off x="0" y="0"/>
+          <a:ext cx="0" cy="0"/>
+          <a:chOff x="0" y="0"/>
+          <a:chExt cx="0" cy="0"/>
+        </a:xfrm>
+      </p:grpSpPr>
+      <p:sp>
+        <p:nvSpPr>
+          <p:cNvPr id="2" name="Title 1"/>
+          <p:cNvSpPr>
+            <a:spLocks noGrp="1"/>
+          </p:cNvSpPr>
+          <p:nvPr>
+            <p:ph type="title"/>
+          </p:nvPr>
+        </p:nvSpPr>
+        <p:spPr>
+          <a:xfrm>
+            <a:off x="457200" y="274638"/>
+            <a:ext cx="8305800" cy="792162"/>
+          </a:xfrm>
+        </p:spPr>
+        <p:txBody>
+          <a:bodyPr>
+            <a:normAutofit/>
+          </a:bodyPr>
+          <a:lstStyle/>
+          <a:p>
+            <a:pPr algn="l"/>
+            <a:r>
+              <a:rPr lang="en-US" dirty="0" smtClean="0">
+                <a:solidFill>
+                  <a:schemeClr val="accent1">
+                    <a:lumMod val="75000"/>
+                  </a:schemeClr>
+                </a:solidFill>
+              </a:rPr>
+              <a:t>Variant - Local Beam Search</a:t>
+            </a:r>
+            <a:endParaRPr lang="en-US" dirty="0">
               <a:solidFill>
-                <a:schemeClr val="accent6">
+                <a:schemeClr val="accent1">
                   <a:lumMod val="75000"/>
                 </a:schemeClr>
               </a:solidFill>
@@ -11849,10 +11691,1160 @@
           </a:p>
         </p:txBody>
       </p:sp>
+      <p:cxnSp>
+        <p:nvCxnSpPr>
+          <p:cNvPr id="5" name="Straight Connector 4"/>
+          <p:cNvCxnSpPr/>
+          <p:nvPr/>
+        </p:nvCxnSpPr>
+        <p:spPr>
+          <a:xfrm>
+            <a:off x="0" y="990600"/>
+            <a:ext cx="9144000" cy="0"/>
+          </a:xfrm>
+          <a:prstGeom prst="line">
+            <a:avLst/>
+          </a:prstGeom>
+          <a:ln w="19050"/>
+        </p:spPr>
+        <p:style>
+          <a:lnRef idx="1">
+            <a:schemeClr val="accent1"/>
+          </a:lnRef>
+          <a:fillRef idx="0">
+            <a:schemeClr val="accent1"/>
+          </a:fillRef>
+          <a:effectRef idx="0">
+            <a:schemeClr val="accent1"/>
+          </a:effectRef>
+          <a:fontRef idx="minor">
+            <a:schemeClr val="tx1"/>
+          </a:fontRef>
+        </p:style>
+      </p:cxnSp>
+      <p:sp>
+        <p:nvSpPr>
+          <p:cNvPr id="3" name="Oval 2"/>
+          <p:cNvSpPr/>
+          <p:nvPr/>
+        </p:nvSpPr>
+        <p:spPr>
+          <a:xfrm>
+            <a:off x="762000" y="4663230"/>
+            <a:ext cx="1295400" cy="1295400"/>
+          </a:xfrm>
+          <a:prstGeom prst="ellipse">
+            <a:avLst/>
+          </a:prstGeom>
+        </p:spPr>
+        <p:style>
+          <a:lnRef idx="2">
+            <a:schemeClr val="accent1">
+              <a:shade val="50000"/>
+            </a:schemeClr>
+          </a:lnRef>
+          <a:fillRef idx="1">
+            <a:schemeClr val="accent1"/>
+          </a:fillRef>
+          <a:effectRef idx="0">
+            <a:schemeClr val="accent1"/>
+          </a:effectRef>
+          <a:fontRef idx="minor">
+            <a:schemeClr val="lt1"/>
+          </a:fontRef>
+        </p:style>
+        <p:txBody>
+          <a:bodyPr rtlCol="0" anchor="ctr"/>
+          <a:lstStyle/>
+          <a:p>
+            <a:pPr algn="ctr"/>
+            <a:r>
+              <a:rPr lang="en-US" dirty="0" smtClean="0"/>
+              <a:t>Hill</a:t>
+            </a:r>
+            <a:br>
+              <a:rPr lang="en-US" dirty="0" smtClean="0"/>
+            </a:br>
+            <a:r>
+              <a:rPr lang="en-US" dirty="0" smtClean="0"/>
+              <a:t>Climber</a:t>
+            </a:r>
+            <a:endParaRPr lang="en-US" dirty="0"/>
+          </a:p>
+        </p:txBody>
+      </p:sp>
+      <p:sp>
+        <p:nvSpPr>
+          <p:cNvPr id="60" name="Oval 59"/>
+          <p:cNvSpPr/>
+          <p:nvPr/>
+        </p:nvSpPr>
+        <p:spPr>
+          <a:xfrm>
+            <a:off x="914400" y="4815630"/>
+            <a:ext cx="1295400" cy="1295400"/>
+          </a:xfrm>
+          <a:prstGeom prst="ellipse">
+            <a:avLst/>
+          </a:prstGeom>
+        </p:spPr>
+        <p:style>
+          <a:lnRef idx="2">
+            <a:schemeClr val="accent1">
+              <a:shade val="50000"/>
+            </a:schemeClr>
+          </a:lnRef>
+          <a:fillRef idx="1">
+            <a:schemeClr val="accent1"/>
+          </a:fillRef>
+          <a:effectRef idx="0">
+            <a:schemeClr val="accent1"/>
+          </a:effectRef>
+          <a:fontRef idx="minor">
+            <a:schemeClr val="lt1"/>
+          </a:fontRef>
+        </p:style>
+        <p:txBody>
+          <a:bodyPr rtlCol="0" anchor="ctr"/>
+          <a:lstStyle/>
+          <a:p>
+            <a:pPr algn="ctr"/>
+            <a:r>
+              <a:rPr lang="en-US" dirty="0" smtClean="0"/>
+              <a:t>Hill</a:t>
+            </a:r>
+            <a:br>
+              <a:rPr lang="en-US" dirty="0" smtClean="0"/>
+            </a:br>
+            <a:r>
+              <a:rPr lang="en-US" dirty="0" smtClean="0"/>
+              <a:t>Climber</a:t>
+            </a:r>
+            <a:endParaRPr lang="en-US" dirty="0"/>
+          </a:p>
+        </p:txBody>
+      </p:sp>
+      <p:sp>
+        <p:nvSpPr>
+          <p:cNvPr id="61" name="Oval 60"/>
+          <p:cNvSpPr/>
+          <p:nvPr/>
+        </p:nvSpPr>
+        <p:spPr>
+          <a:xfrm>
+            <a:off x="1066800" y="4968030"/>
+            <a:ext cx="1295400" cy="1295400"/>
+          </a:xfrm>
+          <a:prstGeom prst="ellipse">
+            <a:avLst/>
+          </a:prstGeom>
+        </p:spPr>
+        <p:style>
+          <a:lnRef idx="2">
+            <a:schemeClr val="accent1">
+              <a:shade val="50000"/>
+            </a:schemeClr>
+          </a:lnRef>
+          <a:fillRef idx="1">
+            <a:schemeClr val="accent1"/>
+          </a:fillRef>
+          <a:effectRef idx="0">
+            <a:schemeClr val="accent1"/>
+          </a:effectRef>
+          <a:fontRef idx="minor">
+            <a:schemeClr val="lt1"/>
+          </a:fontRef>
+        </p:style>
+        <p:txBody>
+          <a:bodyPr rtlCol="0" anchor="ctr"/>
+          <a:lstStyle/>
+          <a:p>
+            <a:pPr algn="ctr"/>
+            <a:r>
+              <a:rPr lang="en-US" dirty="0" smtClean="0"/>
+              <a:t>Hill</a:t>
+            </a:r>
+            <a:br>
+              <a:rPr lang="en-US" dirty="0" smtClean="0"/>
+            </a:br>
+            <a:r>
+              <a:rPr lang="en-US" dirty="0" smtClean="0"/>
+              <a:t>Climber</a:t>
+            </a:r>
+            <a:endParaRPr lang="en-US" dirty="0"/>
+          </a:p>
+        </p:txBody>
+      </p:sp>
+      <p:sp>
+        <p:nvSpPr>
+          <p:cNvPr id="6" name="Rectangle 5"/>
+          <p:cNvSpPr/>
+          <p:nvPr/>
+        </p:nvSpPr>
+        <p:spPr>
+          <a:xfrm>
+            <a:off x="381000" y="1143000"/>
+            <a:ext cx="8458200" cy="3108543"/>
+          </a:xfrm>
+          <a:prstGeom prst="rect">
+            <a:avLst/>
+          </a:prstGeom>
+        </p:spPr>
+        <p:txBody>
+          <a:bodyPr wrap="square">
+            <a:spAutoFit/>
+          </a:bodyPr>
+          <a:lstStyle/>
+          <a:p>
+            <a:pPr marL="285750" indent="-285750">
+              <a:buFont typeface="Arial" panose="020B0604020202020204" pitchFamily="34" charset="0"/>
+              <a:buChar char="•"/>
+            </a:pPr>
+            <a:r>
+              <a:rPr lang="en-US" sz="2800" b="1" dirty="0" smtClean="0">
+                <a:solidFill>
+                  <a:schemeClr val="accent5">
+                    <a:lumMod val="75000"/>
+                  </a:schemeClr>
+                </a:solidFill>
+              </a:rPr>
+              <a:t>Search with multiple (k) Hill </a:t>
+            </a:r>
+            <a:r>
+              <a:rPr lang="en-US" sz="2800" b="1" dirty="0">
+                <a:solidFill>
+                  <a:schemeClr val="accent5">
+                    <a:lumMod val="75000"/>
+                  </a:schemeClr>
+                </a:solidFill>
+              </a:rPr>
+              <a:t>C</a:t>
+            </a:r>
+            <a:r>
+              <a:rPr lang="en-US" sz="2800" b="1" dirty="0" smtClean="0">
+                <a:solidFill>
+                  <a:schemeClr val="accent5">
+                    <a:lumMod val="75000"/>
+                  </a:schemeClr>
+                </a:solidFill>
+              </a:rPr>
+              <a:t>limbers in </a:t>
+            </a:r>
+            <a:r>
+              <a:rPr lang="en-US" sz="2800" b="1" dirty="0" smtClean="0">
+                <a:solidFill>
+                  <a:schemeClr val="accent6">
+                    <a:lumMod val="75000"/>
+                  </a:schemeClr>
+                </a:solidFill>
+              </a:rPr>
+              <a:t>parallel</a:t>
+            </a:r>
+            <a:r>
+              <a:rPr lang="en-US" sz="2800" b="1" dirty="0" smtClean="0">
+                <a:solidFill>
+                  <a:schemeClr val="accent5">
+                    <a:lumMod val="75000"/>
+                  </a:schemeClr>
+                </a:solidFill>
+              </a:rPr>
+              <a:t>.</a:t>
+            </a:r>
+          </a:p>
+          <a:p>
+            <a:pPr marL="742950" lvl="1" indent="-285750">
+              <a:buFont typeface="Arial" panose="020B0604020202020204" pitchFamily="34" charset="0"/>
+              <a:buChar char="•"/>
+            </a:pPr>
+            <a:r>
+              <a:rPr lang="en-US" sz="2400" b="1" dirty="0" smtClean="0">
+                <a:solidFill>
+                  <a:schemeClr val="accent5">
+                    <a:lumMod val="75000"/>
+                  </a:schemeClr>
+                </a:solidFill>
+              </a:rPr>
+              <a:t>Select </a:t>
+            </a:r>
+            <a:r>
+              <a:rPr lang="en-US" sz="2400" b="1" dirty="0" smtClean="0">
+                <a:solidFill>
+                  <a:schemeClr val="accent6">
+                    <a:lumMod val="75000"/>
+                  </a:schemeClr>
+                </a:solidFill>
+              </a:rPr>
+              <a:t>k different </a:t>
+            </a:r>
+            <a:r>
+              <a:rPr lang="en-US" sz="2400" b="1" dirty="0" smtClean="0">
+                <a:solidFill>
+                  <a:schemeClr val="accent5">
+                    <a:lumMod val="75000"/>
+                  </a:schemeClr>
+                </a:solidFill>
+              </a:rPr>
+              <a:t>initial states (nodes).</a:t>
+            </a:r>
+          </a:p>
+          <a:p>
+            <a:pPr marL="742950" lvl="1" indent="-285750">
+              <a:buFont typeface="Arial" panose="020B0604020202020204" pitchFamily="34" charset="0"/>
+              <a:buChar char="•"/>
+            </a:pPr>
+            <a:r>
+              <a:rPr lang="en-US" sz="2400" b="1" dirty="0" smtClean="0">
+                <a:solidFill>
+                  <a:schemeClr val="accent6">
+                    <a:lumMod val="75000"/>
+                  </a:schemeClr>
+                </a:solidFill>
+              </a:rPr>
+              <a:t>Communicate</a:t>
+            </a:r>
+            <a:r>
+              <a:rPr lang="en-US" sz="2400" b="1" dirty="0" smtClean="0">
+                <a:solidFill>
+                  <a:schemeClr val="accent5">
+                    <a:lumMod val="75000"/>
+                  </a:schemeClr>
+                </a:solidFill>
+              </a:rPr>
+              <a:t> between climbers which states (nodes) have</a:t>
+            </a:r>
+          </a:p>
+          <a:p>
+            <a:pPr lvl="1"/>
+            <a:r>
+              <a:rPr lang="en-US" sz="2400" b="1" dirty="0">
+                <a:solidFill>
+                  <a:schemeClr val="accent5">
+                    <a:lumMod val="75000"/>
+                  </a:schemeClr>
+                </a:solidFill>
+              </a:rPr>
+              <a:t> </a:t>
+            </a:r>
+            <a:r>
+              <a:rPr lang="en-US" sz="2400" b="1" dirty="0" smtClean="0">
+                <a:solidFill>
+                  <a:schemeClr val="accent5">
+                    <a:lumMod val="75000"/>
+                  </a:schemeClr>
+                </a:solidFill>
+              </a:rPr>
+              <a:t>   been </a:t>
+            </a:r>
+            <a:r>
+              <a:rPr lang="en-US" sz="2400" b="1" dirty="0" smtClean="0">
+                <a:solidFill>
+                  <a:schemeClr val="accent6">
+                    <a:lumMod val="75000"/>
+                  </a:schemeClr>
+                </a:solidFill>
+              </a:rPr>
+              <a:t>visited</a:t>
+            </a:r>
+            <a:r>
+              <a:rPr lang="en-US" sz="2400" b="1" dirty="0" smtClean="0">
+                <a:solidFill>
+                  <a:schemeClr val="accent5">
+                    <a:lumMod val="75000"/>
+                  </a:schemeClr>
+                </a:solidFill>
+              </a:rPr>
+              <a:t>.</a:t>
+            </a:r>
+          </a:p>
+          <a:p>
+            <a:pPr marL="742950" lvl="1" indent="-285750">
+              <a:buFont typeface="Arial" panose="020B0604020202020204" pitchFamily="34" charset="0"/>
+              <a:buChar char="•"/>
+            </a:pPr>
+            <a:r>
+              <a:rPr lang="en-US" sz="2400" b="1" dirty="0" smtClean="0">
+                <a:solidFill>
+                  <a:schemeClr val="accent6">
+                    <a:lumMod val="75000"/>
+                  </a:schemeClr>
+                </a:solidFill>
+              </a:rPr>
+              <a:t>Terminate</a:t>
+            </a:r>
+            <a:r>
+              <a:rPr lang="en-US" sz="2400" b="1" dirty="0" smtClean="0">
+                <a:solidFill>
+                  <a:schemeClr val="accent5">
+                    <a:lumMod val="75000"/>
+                  </a:schemeClr>
+                </a:solidFill>
+              </a:rPr>
+              <a:t> Hill Climber if state (node) </a:t>
+            </a:r>
+            <a:r>
+              <a:rPr lang="en-US" sz="2400" b="1" dirty="0" smtClean="0">
+                <a:solidFill>
+                  <a:schemeClr val="accent6">
+                    <a:lumMod val="75000"/>
+                  </a:schemeClr>
+                </a:solidFill>
+              </a:rPr>
+              <a:t>already visited </a:t>
+            </a:r>
+            <a:r>
+              <a:rPr lang="en-US" sz="2400" b="1" dirty="0" smtClean="0">
+                <a:solidFill>
+                  <a:schemeClr val="accent5">
+                    <a:lumMod val="75000"/>
+                  </a:schemeClr>
+                </a:solidFill>
+              </a:rPr>
+              <a:t>by</a:t>
+            </a:r>
+          </a:p>
+          <a:p>
+            <a:pPr lvl="1"/>
+            <a:r>
+              <a:rPr lang="en-US" sz="2400" b="1" dirty="0">
+                <a:solidFill>
+                  <a:schemeClr val="accent5">
+                    <a:lumMod val="75000"/>
+                  </a:schemeClr>
+                </a:solidFill>
+              </a:rPr>
+              <a:t> </a:t>
+            </a:r>
+            <a:r>
+              <a:rPr lang="en-US" sz="2400" b="1" dirty="0" smtClean="0">
+                <a:solidFill>
+                  <a:schemeClr val="accent5">
+                    <a:lumMod val="75000"/>
+                  </a:schemeClr>
+                </a:solidFill>
+              </a:rPr>
+              <a:t>    another Hill Climber – eliminates duplication in search.</a:t>
+            </a:r>
+          </a:p>
+          <a:p>
+            <a:pPr marL="742950" lvl="1" indent="-285750">
+              <a:buFont typeface="Arial" panose="020B0604020202020204" pitchFamily="34" charset="0"/>
+              <a:buChar char="•"/>
+            </a:pPr>
+            <a:r>
+              <a:rPr lang="en-US" sz="2400" b="1" dirty="0" smtClean="0">
+                <a:solidFill>
+                  <a:schemeClr val="accent5">
+                    <a:lumMod val="75000"/>
+                  </a:schemeClr>
+                </a:solidFill>
+              </a:rPr>
+              <a:t>When all Hill Climbers reach </a:t>
+            </a:r>
+            <a:r>
+              <a:rPr lang="en-US" sz="2400" b="1" dirty="0" smtClean="0">
+                <a:solidFill>
+                  <a:schemeClr val="accent6">
+                    <a:lumMod val="75000"/>
+                  </a:schemeClr>
+                </a:solidFill>
+              </a:rPr>
+              <a:t>terminal state </a:t>
+            </a:r>
+            <a:r>
+              <a:rPr lang="en-US" sz="2400" b="1" dirty="0" smtClean="0">
+                <a:solidFill>
+                  <a:schemeClr val="accent5">
+                    <a:lumMod val="75000"/>
+                  </a:schemeClr>
+                </a:solidFill>
+              </a:rPr>
+              <a:t>(node), select</a:t>
+            </a:r>
+          </a:p>
+          <a:p>
+            <a:pPr lvl="1"/>
+            <a:r>
+              <a:rPr lang="en-US" sz="2400" b="1" dirty="0">
+                <a:solidFill>
+                  <a:schemeClr val="accent5">
+                    <a:lumMod val="75000"/>
+                  </a:schemeClr>
+                </a:solidFill>
+              </a:rPr>
+              <a:t> </a:t>
+            </a:r>
+            <a:r>
+              <a:rPr lang="en-US" sz="2400" b="1" dirty="0" smtClean="0">
+                <a:solidFill>
+                  <a:schemeClr val="accent5">
+                    <a:lumMod val="75000"/>
+                  </a:schemeClr>
+                </a:solidFill>
+              </a:rPr>
+              <a:t>   path with the </a:t>
+            </a:r>
+            <a:r>
+              <a:rPr lang="en-US" sz="2400" b="1" dirty="0" smtClean="0">
+                <a:solidFill>
+                  <a:schemeClr val="accent6">
+                    <a:lumMod val="75000"/>
+                  </a:schemeClr>
+                </a:solidFill>
+              </a:rPr>
+              <a:t>highest</a:t>
+            </a:r>
+            <a:r>
+              <a:rPr lang="en-US" sz="2400" b="1" dirty="0" smtClean="0">
+                <a:solidFill>
+                  <a:schemeClr val="accent5">
+                    <a:lumMod val="75000"/>
+                  </a:schemeClr>
+                </a:solidFill>
+              </a:rPr>
+              <a:t> value function.</a:t>
+            </a:r>
+            <a:endParaRPr lang="en-US" sz="2400" b="1" dirty="0">
+              <a:solidFill>
+                <a:schemeClr val="accent5">
+                  <a:lumMod val="75000"/>
+                </a:schemeClr>
+              </a:solidFill>
+            </a:endParaRPr>
+          </a:p>
+        </p:txBody>
+      </p:sp>
+      <p:graphicFrame>
+        <p:nvGraphicFramePr>
+          <p:cNvPr id="8" name="Table 7"/>
+          <p:cNvGraphicFramePr>
+            <a:graphicFrameLocks noGrp="1"/>
+          </p:cNvGraphicFramePr>
+          <p:nvPr>
+            <p:extLst>
+              <p:ext uri="{D42A27DB-BD31-4B8C-83A1-F6EECF244321}">
+                <p14:modId xmlns:p14="http://schemas.microsoft.com/office/powerpoint/2010/main" val="1775435709"/>
+              </p:ext>
+            </p:extLst>
+          </p:nvPr>
+        </p:nvGraphicFramePr>
+        <p:xfrm>
+          <a:off x="3657600" y="4663230"/>
+          <a:ext cx="1676400" cy="1478280"/>
+        </p:xfrm>
+        <a:graphic>
+          <a:graphicData uri="http://schemas.openxmlformats.org/drawingml/2006/table">
+            <a:tbl>
+              <a:tblPr firstRow="1" bandRow="1">
+                <a:tableStyleId>{5C22544A-7EE6-4342-B048-85BDC9FD1C3A}</a:tableStyleId>
+              </a:tblPr>
+              <a:tblGrid>
+                <a:gridCol w="914400"/>
+                <a:gridCol w="762000"/>
+              </a:tblGrid>
+              <a:tr h="0">
+                <a:tc>
+                  <a:txBody>
+                    <a:bodyPr/>
+                    <a:lstStyle/>
+                    <a:p>
+                      <a:r>
+                        <a:rPr lang="en-US" dirty="0" smtClean="0"/>
+                        <a:t>Node</a:t>
+                      </a:r>
+                      <a:endParaRPr lang="en-US" dirty="0"/>
+                    </a:p>
+                  </a:txBody>
+                  <a:tcPr/>
+                </a:tc>
+                <a:tc>
+                  <a:txBody>
+                    <a:bodyPr/>
+                    <a:lstStyle/>
+                    <a:p>
+                      <a:r>
+                        <a:rPr lang="en-US" dirty="0" smtClean="0"/>
+                        <a:t>Value</a:t>
+                      </a:r>
+                      <a:endParaRPr lang="en-US" dirty="0"/>
+                    </a:p>
+                  </a:txBody>
+                  <a:tcPr/>
+                </a:tc>
+              </a:tr>
+              <a:tr h="370840">
+                <a:tc>
+                  <a:txBody>
+                    <a:bodyPr/>
+                    <a:lstStyle/>
+                    <a:p>
+                      <a:endParaRPr lang="en-US"/>
+                    </a:p>
+                  </a:txBody>
+                  <a:tcPr/>
+                </a:tc>
+                <a:tc>
+                  <a:txBody>
+                    <a:bodyPr/>
+                    <a:lstStyle/>
+                    <a:p>
+                      <a:endParaRPr lang="en-US"/>
+                    </a:p>
+                  </a:txBody>
+                  <a:tcPr/>
+                </a:tc>
+              </a:tr>
+              <a:tr h="370840">
+                <a:tc>
+                  <a:txBody>
+                    <a:bodyPr/>
+                    <a:lstStyle/>
+                    <a:p>
+                      <a:endParaRPr lang="en-US"/>
+                    </a:p>
+                  </a:txBody>
+                  <a:tcPr/>
+                </a:tc>
+                <a:tc>
+                  <a:txBody>
+                    <a:bodyPr/>
+                    <a:lstStyle/>
+                    <a:p>
+                      <a:endParaRPr lang="en-US"/>
+                    </a:p>
+                  </a:txBody>
+                  <a:tcPr/>
+                </a:tc>
+              </a:tr>
+              <a:tr h="370840">
+                <a:tc>
+                  <a:txBody>
+                    <a:bodyPr/>
+                    <a:lstStyle/>
+                    <a:p>
+                      <a:endParaRPr lang="en-US"/>
+                    </a:p>
+                  </a:txBody>
+                  <a:tcPr/>
+                </a:tc>
+                <a:tc>
+                  <a:txBody>
+                    <a:bodyPr/>
+                    <a:lstStyle/>
+                    <a:p>
+                      <a:endParaRPr lang="en-US" dirty="0"/>
+                    </a:p>
+                  </a:txBody>
+                  <a:tcPr/>
+                </a:tc>
+              </a:tr>
+            </a:tbl>
+          </a:graphicData>
+        </a:graphic>
+      </p:graphicFrame>
+      <p:sp>
+        <p:nvSpPr>
+          <p:cNvPr id="9" name="Right Arrow 8"/>
+          <p:cNvSpPr/>
+          <p:nvPr/>
+        </p:nvSpPr>
+        <p:spPr>
+          <a:xfrm>
+            <a:off x="2438400" y="5387130"/>
+            <a:ext cx="1143000" cy="152400"/>
+          </a:xfrm>
+          <a:prstGeom prst="rightArrow">
+            <a:avLst/>
+          </a:prstGeom>
+          <a:solidFill>
+            <a:srgbClr val="00B050"/>
+          </a:solidFill>
+          <a:ln>
+            <a:solidFill>
+              <a:srgbClr val="00B050"/>
+            </a:solidFill>
+          </a:ln>
+        </p:spPr>
+        <p:style>
+          <a:lnRef idx="2">
+            <a:schemeClr val="accent1">
+              <a:shade val="50000"/>
+            </a:schemeClr>
+          </a:lnRef>
+          <a:fillRef idx="1">
+            <a:schemeClr val="accent1"/>
+          </a:fillRef>
+          <a:effectRef idx="0">
+            <a:schemeClr val="accent1"/>
+          </a:effectRef>
+          <a:fontRef idx="minor">
+            <a:schemeClr val="lt1"/>
+          </a:fontRef>
+        </p:style>
+        <p:txBody>
+          <a:bodyPr rtlCol="0" anchor="ctr"/>
+          <a:lstStyle/>
+          <a:p>
+            <a:pPr algn="ctr"/>
+            <a:endParaRPr lang="en-US"/>
+          </a:p>
+        </p:txBody>
+      </p:sp>
+      <p:sp>
+        <p:nvSpPr>
+          <p:cNvPr id="69" name="TextBox 68"/>
+          <p:cNvSpPr txBox="1"/>
+          <p:nvPr/>
+        </p:nvSpPr>
+        <p:spPr>
+          <a:xfrm>
+            <a:off x="3962400" y="4368371"/>
+            <a:ext cx="1211614" cy="307777"/>
+          </a:xfrm>
+          <a:prstGeom prst="rect">
+            <a:avLst/>
+          </a:prstGeom>
+          <a:noFill/>
+        </p:spPr>
+        <p:txBody>
+          <a:bodyPr wrap="none" rtlCol="0">
+            <a:spAutoFit/>
+          </a:bodyPr>
+          <a:lstStyle/>
+          <a:p>
+            <a:r>
+              <a:rPr lang="en-US" sz="1400" b="1" dirty="0" smtClean="0"/>
+              <a:t>Visited Nodes</a:t>
+            </a:r>
+            <a:endParaRPr lang="en-US" sz="1400" b="1" dirty="0"/>
+          </a:p>
+        </p:txBody>
+      </p:sp>
+      <p:sp>
+        <p:nvSpPr>
+          <p:cNvPr id="71" name="TextBox 70"/>
+          <p:cNvSpPr txBox="1"/>
+          <p:nvPr/>
+        </p:nvSpPr>
+        <p:spPr>
+          <a:xfrm>
+            <a:off x="762000" y="4355453"/>
+            <a:ext cx="1550681" cy="307777"/>
+          </a:xfrm>
+          <a:prstGeom prst="rect">
+            <a:avLst/>
+          </a:prstGeom>
+          <a:noFill/>
+        </p:spPr>
+        <p:txBody>
+          <a:bodyPr wrap="none" rtlCol="0">
+            <a:spAutoFit/>
+          </a:bodyPr>
+          <a:lstStyle/>
+          <a:p>
+            <a:r>
+              <a:rPr lang="en-US" sz="1400" b="1" dirty="0" smtClean="0"/>
+              <a:t>K parallel climbers</a:t>
+            </a:r>
+            <a:endParaRPr lang="en-US" sz="1400" b="1" dirty="0"/>
+          </a:p>
+        </p:txBody>
+      </p:sp>
+      <p:sp>
+        <p:nvSpPr>
+          <p:cNvPr id="72" name="Right Arrow 71"/>
+          <p:cNvSpPr/>
+          <p:nvPr/>
+        </p:nvSpPr>
+        <p:spPr>
+          <a:xfrm rot="10800000">
+            <a:off x="2438400" y="5615730"/>
+            <a:ext cx="1143000" cy="152400"/>
+          </a:xfrm>
+          <a:prstGeom prst="rightArrow">
+            <a:avLst/>
+          </a:prstGeom>
+          <a:solidFill>
+            <a:srgbClr val="FF0000"/>
+          </a:solidFill>
+          <a:ln>
+            <a:solidFill>
+              <a:srgbClr val="FF0000"/>
+            </a:solidFill>
+          </a:ln>
+        </p:spPr>
+        <p:style>
+          <a:lnRef idx="2">
+            <a:schemeClr val="accent1">
+              <a:shade val="50000"/>
+            </a:schemeClr>
+          </a:lnRef>
+          <a:fillRef idx="1">
+            <a:schemeClr val="accent1"/>
+          </a:fillRef>
+          <a:effectRef idx="0">
+            <a:schemeClr val="accent1"/>
+          </a:effectRef>
+          <a:fontRef idx="minor">
+            <a:schemeClr val="lt1"/>
+          </a:fontRef>
+        </p:style>
+        <p:txBody>
+          <a:bodyPr rtlCol="0" anchor="ctr"/>
+          <a:lstStyle/>
+          <a:p>
+            <a:pPr algn="ctr"/>
+            <a:endParaRPr lang="en-US"/>
+          </a:p>
+        </p:txBody>
+      </p:sp>
+      <p:sp>
+        <p:nvSpPr>
+          <p:cNvPr id="13" name="TextBox 12"/>
+          <p:cNvSpPr txBox="1"/>
+          <p:nvPr/>
+        </p:nvSpPr>
+        <p:spPr>
+          <a:xfrm>
+            <a:off x="2238374" y="6111030"/>
+            <a:ext cx="1596399" cy="461665"/>
+          </a:xfrm>
+          <a:prstGeom prst="rect">
+            <a:avLst/>
+          </a:prstGeom>
+          <a:noFill/>
+        </p:spPr>
+        <p:txBody>
+          <a:bodyPr wrap="none" rtlCol="0">
+            <a:spAutoFit/>
+          </a:bodyPr>
+          <a:lstStyle/>
+          <a:p>
+            <a:r>
+              <a:rPr lang="en-US" sz="1200" dirty="0" smtClean="0">
+                <a:solidFill>
+                  <a:srgbClr val="FF0000"/>
+                </a:solidFill>
+              </a:rPr>
+              <a:t>Terminate climber</a:t>
+            </a:r>
+          </a:p>
+          <a:p>
+            <a:r>
+              <a:rPr lang="en-US" sz="1200" dirty="0" smtClean="0">
+                <a:solidFill>
+                  <a:srgbClr val="FF0000"/>
+                </a:solidFill>
+              </a:rPr>
+              <a:t>if node already visited.</a:t>
+            </a:r>
+            <a:endParaRPr lang="en-US" sz="1200" dirty="0">
+              <a:solidFill>
+                <a:srgbClr val="FF0000"/>
+              </a:solidFill>
+            </a:endParaRPr>
+          </a:p>
+        </p:txBody>
+      </p:sp>
+      <p:cxnSp>
+        <p:nvCxnSpPr>
+          <p:cNvPr id="15" name="Curved Connector 14"/>
+          <p:cNvCxnSpPr/>
+          <p:nvPr/>
+        </p:nvCxnSpPr>
+        <p:spPr>
+          <a:xfrm rot="5400000" flipH="1" flipV="1">
+            <a:off x="2495550" y="5863380"/>
+            <a:ext cx="342900" cy="152400"/>
+          </a:xfrm>
+          <a:prstGeom prst="curvedConnector3">
+            <a:avLst/>
+          </a:prstGeom>
+          <a:ln>
+            <a:solidFill>
+              <a:srgbClr val="FF0000"/>
+            </a:solidFill>
+            <a:tailEnd type="arrow"/>
+          </a:ln>
+        </p:spPr>
+        <p:style>
+          <a:lnRef idx="1">
+            <a:schemeClr val="accent1"/>
+          </a:lnRef>
+          <a:fillRef idx="0">
+            <a:schemeClr val="accent1"/>
+          </a:fillRef>
+          <a:effectRef idx="0">
+            <a:schemeClr val="accent1"/>
+          </a:effectRef>
+          <a:fontRef idx="minor">
+            <a:schemeClr val="tx1"/>
+          </a:fontRef>
+        </p:style>
+      </p:cxnSp>
+      <p:sp>
+        <p:nvSpPr>
+          <p:cNvPr id="73" name="TextBox 72"/>
+          <p:cNvSpPr txBox="1"/>
+          <p:nvPr/>
+        </p:nvSpPr>
+        <p:spPr>
+          <a:xfrm>
+            <a:off x="2209800" y="4663229"/>
+            <a:ext cx="1324722" cy="461665"/>
+          </a:xfrm>
+          <a:prstGeom prst="rect">
+            <a:avLst/>
+          </a:prstGeom>
+          <a:noFill/>
+        </p:spPr>
+        <p:txBody>
+          <a:bodyPr wrap="none" rtlCol="0">
+            <a:spAutoFit/>
+          </a:bodyPr>
+          <a:lstStyle/>
+          <a:p>
+            <a:r>
+              <a:rPr lang="en-US" sz="1200" dirty="0" smtClean="0">
+                <a:solidFill>
+                  <a:srgbClr val="00B050"/>
+                </a:solidFill>
+              </a:rPr>
+              <a:t>Store visited node</a:t>
+            </a:r>
+          </a:p>
+          <a:p>
+            <a:r>
+              <a:rPr lang="en-US" sz="1200" dirty="0">
+                <a:solidFill>
+                  <a:srgbClr val="00B050"/>
+                </a:solidFill>
+              </a:rPr>
+              <a:t>i</a:t>
+            </a:r>
+            <a:r>
+              <a:rPr lang="en-US" sz="1200" dirty="0" smtClean="0">
+                <a:solidFill>
+                  <a:srgbClr val="00B050"/>
+                </a:solidFill>
+              </a:rPr>
+              <a:t>n shared memory</a:t>
+            </a:r>
+            <a:endParaRPr lang="en-US" sz="1200" dirty="0">
+              <a:solidFill>
+                <a:srgbClr val="00B050"/>
+              </a:solidFill>
+            </a:endParaRPr>
+          </a:p>
+        </p:txBody>
+      </p:sp>
+      <p:cxnSp>
+        <p:nvCxnSpPr>
+          <p:cNvPr id="74" name="Curved Connector 73"/>
+          <p:cNvCxnSpPr/>
+          <p:nvPr/>
+        </p:nvCxnSpPr>
+        <p:spPr>
+          <a:xfrm rot="16200000" flipH="1">
+            <a:off x="2799564" y="5150120"/>
+            <a:ext cx="321619" cy="152400"/>
+          </a:xfrm>
+          <a:prstGeom prst="curvedConnector3">
+            <a:avLst/>
+          </a:prstGeom>
+          <a:ln>
+            <a:solidFill>
+              <a:srgbClr val="00B050"/>
+            </a:solidFill>
+            <a:tailEnd type="arrow"/>
+          </a:ln>
+        </p:spPr>
+        <p:style>
+          <a:lnRef idx="1">
+            <a:schemeClr val="accent1"/>
+          </a:lnRef>
+          <a:fillRef idx="0">
+            <a:schemeClr val="accent1"/>
+          </a:fillRef>
+          <a:effectRef idx="0">
+            <a:schemeClr val="accent1"/>
+          </a:effectRef>
+          <a:fontRef idx="minor">
+            <a:schemeClr val="tx1"/>
+          </a:fontRef>
+        </p:style>
+      </p:cxnSp>
+      <p:sp>
+        <p:nvSpPr>
+          <p:cNvPr id="19" name="Rectangle 18"/>
+          <p:cNvSpPr/>
+          <p:nvPr/>
+        </p:nvSpPr>
+        <p:spPr>
+          <a:xfrm>
+            <a:off x="457200" y="4266573"/>
+            <a:ext cx="5410200" cy="2377857"/>
+          </a:xfrm>
+          <a:prstGeom prst="rect">
+            <a:avLst/>
+          </a:prstGeom>
+          <a:solidFill>
+            <a:schemeClr val="bg1">
+              <a:lumMod val="65000"/>
+              <a:alpha val="19000"/>
+            </a:schemeClr>
+          </a:solidFill>
+          <a:ln>
+            <a:solidFill>
+              <a:schemeClr val="bg1">
+                <a:lumMod val="65000"/>
+              </a:schemeClr>
+            </a:solidFill>
+          </a:ln>
+        </p:spPr>
+        <p:style>
+          <a:lnRef idx="2">
+            <a:schemeClr val="accent1">
+              <a:shade val="50000"/>
+            </a:schemeClr>
+          </a:lnRef>
+          <a:fillRef idx="1">
+            <a:schemeClr val="accent1"/>
+          </a:fillRef>
+          <a:effectRef idx="0">
+            <a:schemeClr val="accent1"/>
+          </a:effectRef>
+          <a:fontRef idx="minor">
+            <a:schemeClr val="lt1"/>
+          </a:fontRef>
+        </p:style>
+        <p:txBody>
+          <a:bodyPr rtlCol="0" anchor="ctr"/>
+          <a:lstStyle/>
+          <a:p>
+            <a:pPr algn="ctr"/>
+            <a:endParaRPr lang="en-US"/>
+          </a:p>
+        </p:txBody>
+      </p:sp>
+      <p:sp>
+        <p:nvSpPr>
+          <p:cNvPr id="20" name="Right Arrow 19"/>
+          <p:cNvSpPr/>
+          <p:nvPr/>
+        </p:nvSpPr>
+        <p:spPr>
+          <a:xfrm>
+            <a:off x="6019800" y="4522259"/>
+            <a:ext cx="762000" cy="1896547"/>
+          </a:xfrm>
+          <a:prstGeom prst="rightArrow">
+            <a:avLst/>
+          </a:prstGeom>
+          <a:solidFill>
+            <a:schemeClr val="bg1">
+              <a:lumMod val="65000"/>
+            </a:schemeClr>
+          </a:solidFill>
+          <a:ln>
+            <a:solidFill>
+              <a:schemeClr val="bg1">
+                <a:lumMod val="65000"/>
+              </a:schemeClr>
+            </a:solidFill>
+          </a:ln>
+        </p:spPr>
+        <p:style>
+          <a:lnRef idx="2">
+            <a:schemeClr val="accent1">
+              <a:shade val="50000"/>
+            </a:schemeClr>
+          </a:lnRef>
+          <a:fillRef idx="1">
+            <a:schemeClr val="accent1"/>
+          </a:fillRef>
+          <a:effectRef idx="0">
+            <a:schemeClr val="accent1"/>
+          </a:effectRef>
+          <a:fontRef idx="minor">
+            <a:schemeClr val="lt1"/>
+          </a:fontRef>
+        </p:style>
+        <p:txBody>
+          <a:bodyPr rtlCol="0" anchor="ctr"/>
+          <a:lstStyle/>
+          <a:p>
+            <a:pPr algn="ctr"/>
+            <a:endParaRPr lang="en-US"/>
+          </a:p>
+        </p:txBody>
+      </p:sp>
+      <p:sp>
+        <p:nvSpPr>
+          <p:cNvPr id="21" name="Rounded Rectangle 20"/>
+          <p:cNvSpPr/>
+          <p:nvPr/>
+        </p:nvSpPr>
+        <p:spPr>
+          <a:xfrm>
+            <a:off x="7010400" y="4815630"/>
+            <a:ext cx="1752600" cy="1295400"/>
+          </a:xfrm>
+          <a:prstGeom prst="roundRect">
+            <a:avLst/>
+          </a:prstGeom>
+          <a:solidFill>
+            <a:schemeClr val="bg1">
+              <a:lumMod val="65000"/>
+            </a:schemeClr>
+          </a:solidFill>
+          <a:ln>
+            <a:solidFill>
+              <a:schemeClr val="bg1">
+                <a:lumMod val="65000"/>
+              </a:schemeClr>
+            </a:solidFill>
+          </a:ln>
+        </p:spPr>
+        <p:style>
+          <a:lnRef idx="2">
+            <a:schemeClr val="accent1">
+              <a:shade val="50000"/>
+            </a:schemeClr>
+          </a:lnRef>
+          <a:fillRef idx="1">
+            <a:schemeClr val="accent1"/>
+          </a:fillRef>
+          <a:effectRef idx="0">
+            <a:schemeClr val="accent1"/>
+          </a:effectRef>
+          <a:fontRef idx="minor">
+            <a:schemeClr val="lt1"/>
+          </a:fontRef>
+        </p:style>
+        <p:txBody>
+          <a:bodyPr rtlCol="0" anchor="ctr"/>
+          <a:lstStyle/>
+          <a:p>
+            <a:pPr algn="ctr"/>
+            <a:r>
+              <a:rPr lang="en-US" dirty="0" smtClean="0"/>
+              <a:t>Select</a:t>
+            </a:r>
+            <a:r>
+              <a:rPr lang="en-US" dirty="0"/>
+              <a:t> </a:t>
+            </a:r>
+            <a:r>
+              <a:rPr lang="en-US" dirty="0" smtClean="0"/>
+              <a:t>Climber with Highest Value Function</a:t>
+            </a:r>
+          </a:p>
+        </p:txBody>
+      </p:sp>
     </p:spTree>
     <p:extLst>
       <p:ext uri="{BB962C8B-B14F-4D97-AF65-F5344CB8AC3E}">
-        <p14:creationId xmlns:p14="http://schemas.microsoft.com/office/powerpoint/2010/main" val="1995494273"/>
+        <p14:creationId xmlns:p14="http://schemas.microsoft.com/office/powerpoint/2010/main" val="2415273980"/>
       </p:ext>
     </p:extLst>
   </p:cSld>

</xml_diff>